<commit_message>
google glass et lord of war powerpoint
</commit_message>
<xml_diff>
--- a/BTS 1er année/Anglais/Anglais technique/Google Glass/Google Glass.pptx
+++ b/BTS 1er année/Anglais/Anglais technique/Google Glass/Google Glass.pptx
@@ -13,7 +13,8 @@
     <p:sldId id="267" r:id="rId7"/>
     <p:sldId id="268" r:id="rId8"/>
     <p:sldId id="270" r:id="rId9"/>
-    <p:sldId id="265" r:id="rId10"/>
+    <p:sldId id="271" r:id="rId10"/>
+    <p:sldId id="265" r:id="rId11"/>
   </p:sldIdLst>
   <p:sldSz cx="12192000" cy="6858000"/>
   <p:notesSz cx="6858000" cy="9144000"/>
@@ -125,6 +126,7 @@
             <p14:sldId id="267"/>
             <p14:sldId id="268"/>
             <p14:sldId id="270"/>
+            <p14:sldId id="271"/>
             <p14:sldId id="265"/>
           </p14:sldIdLst>
         </p14:section>
@@ -325,7 +327,7 @@
           <a:p>
             <a:fld id="{300EF72D-BF44-4867-ABC7-65F7BCDC414A}" type="datetimeFigureOut">
               <a:rPr lang="fr-FR" smtClean="0"/>
-              <a:t>18/10/2018</a:t>
+              <a:t>09/11/2018</a:t>
             </a:fld>
             <a:endParaRPr lang="fr-FR"/>
           </a:p>
@@ -663,7 +665,7 @@
           <a:p>
             <a:fld id="{300EF72D-BF44-4867-ABC7-65F7BCDC414A}" type="datetimeFigureOut">
               <a:rPr lang="fr-FR" smtClean="0"/>
-              <a:t>18/10/2018</a:t>
+              <a:t>09/11/2018</a:t>
             </a:fld>
             <a:endParaRPr lang="fr-FR"/>
           </a:p>
@@ -1064,7 +1066,7 @@
           <a:p>
             <a:fld id="{300EF72D-BF44-4867-ABC7-65F7BCDC414A}" type="datetimeFigureOut">
               <a:rPr lang="fr-FR" smtClean="0"/>
-              <a:t>18/10/2018</a:t>
+              <a:t>09/11/2018</a:t>
             </a:fld>
             <a:endParaRPr lang="fr-FR"/>
           </a:p>
@@ -1400,7 +1402,7 @@
           <a:p>
             <a:fld id="{300EF72D-BF44-4867-ABC7-65F7BCDC414A}" type="datetimeFigureOut">
               <a:rPr lang="fr-FR" smtClean="0"/>
-              <a:t>18/10/2018</a:t>
+              <a:t>09/11/2018</a:t>
             </a:fld>
             <a:endParaRPr lang="fr-FR"/>
           </a:p>
@@ -1720,7 +1722,7 @@
           <a:p>
             <a:fld id="{300EF72D-BF44-4867-ABC7-65F7BCDC414A}" type="datetimeFigureOut">
               <a:rPr lang="fr-FR" smtClean="0"/>
-              <a:t>18/10/2018</a:t>
+              <a:t>09/11/2018</a:t>
             </a:fld>
             <a:endParaRPr lang="fr-FR"/>
           </a:p>
@@ -2116,7 +2118,7 @@
           <a:p>
             <a:fld id="{300EF72D-BF44-4867-ABC7-65F7BCDC414A}" type="datetimeFigureOut">
               <a:rPr lang="fr-FR" smtClean="0"/>
-              <a:t>18/10/2018</a:t>
+              <a:t>09/11/2018</a:t>
             </a:fld>
             <a:endParaRPr lang="fr-FR"/>
           </a:p>
@@ -2373,7 +2375,7 @@
           <a:p>
             <a:fld id="{300EF72D-BF44-4867-ABC7-65F7BCDC414A}" type="datetimeFigureOut">
               <a:rPr lang="fr-FR" smtClean="0"/>
-              <a:t>18/10/2018</a:t>
+              <a:t>09/11/2018</a:t>
             </a:fld>
             <a:endParaRPr lang="fr-FR"/>
           </a:p>
@@ -2635,7 +2637,7 @@
           <a:p>
             <a:fld id="{300EF72D-BF44-4867-ABC7-65F7BCDC414A}" type="datetimeFigureOut">
               <a:rPr lang="fr-FR" smtClean="0"/>
-              <a:t>18/10/2018</a:t>
+              <a:t>09/11/2018</a:t>
             </a:fld>
             <a:endParaRPr lang="fr-FR"/>
           </a:p>
@@ -2897,7 +2899,7 @@
           <a:p>
             <a:fld id="{300EF72D-BF44-4867-ABC7-65F7BCDC414A}" type="datetimeFigureOut">
               <a:rPr lang="fr-FR" smtClean="0"/>
-              <a:t>18/10/2018</a:t>
+              <a:t>09/11/2018</a:t>
             </a:fld>
             <a:endParaRPr lang="fr-FR"/>
           </a:p>
@@ -3226,7 +3228,7 @@
           <a:p>
             <a:fld id="{300EF72D-BF44-4867-ABC7-65F7BCDC414A}" type="datetimeFigureOut">
               <a:rPr lang="fr-FR" smtClean="0"/>
-              <a:t>18/10/2018</a:t>
+              <a:t>09/11/2018</a:t>
             </a:fld>
             <a:endParaRPr lang="fr-FR"/>
           </a:p>
@@ -3549,7 +3551,7 @@
           <a:p>
             <a:fld id="{300EF72D-BF44-4867-ABC7-65F7BCDC414A}" type="datetimeFigureOut">
               <a:rPr lang="fr-FR" smtClean="0"/>
-              <a:t>18/10/2018</a:t>
+              <a:t>09/11/2018</a:t>
             </a:fld>
             <a:endParaRPr lang="fr-FR"/>
           </a:p>
@@ -4006,7 +4008,7 @@
           <a:p>
             <a:fld id="{300EF72D-BF44-4867-ABC7-65F7BCDC414A}" type="datetimeFigureOut">
               <a:rPr lang="fr-FR" smtClean="0"/>
-              <a:t>18/10/2018</a:t>
+              <a:t>09/11/2018</a:t>
             </a:fld>
             <a:endParaRPr lang="fr-FR"/>
           </a:p>
@@ -4211,7 +4213,7 @@
           <a:p>
             <a:fld id="{300EF72D-BF44-4867-ABC7-65F7BCDC414A}" type="datetimeFigureOut">
               <a:rPr lang="fr-FR" smtClean="0"/>
-              <a:t>18/10/2018</a:t>
+              <a:t>09/11/2018</a:t>
             </a:fld>
             <a:endParaRPr lang="fr-FR"/>
           </a:p>
@@ -4388,7 +4390,7 @@
           <a:p>
             <a:fld id="{300EF72D-BF44-4867-ABC7-65F7BCDC414A}" type="datetimeFigureOut">
               <a:rPr lang="fr-FR" smtClean="0"/>
-              <a:t>18/10/2018</a:t>
+              <a:t>09/11/2018</a:t>
             </a:fld>
             <a:endParaRPr lang="fr-FR"/>
           </a:p>
@@ -4721,7 +4723,7 @@
           <a:p>
             <a:fld id="{300EF72D-BF44-4867-ABC7-65F7BCDC414A}" type="datetimeFigureOut">
               <a:rPr lang="fr-FR" smtClean="0"/>
-              <a:t>18/10/2018</a:t>
+              <a:t>09/11/2018</a:t>
             </a:fld>
             <a:endParaRPr lang="fr-FR"/>
           </a:p>
@@ -5066,7 +5068,7 @@
           <a:p>
             <a:fld id="{300EF72D-BF44-4867-ABC7-65F7BCDC414A}" type="datetimeFigureOut">
               <a:rPr lang="fr-FR" smtClean="0"/>
-              <a:t>18/10/2018</a:t>
+              <a:t>09/11/2018</a:t>
             </a:fld>
             <a:endParaRPr lang="fr-FR"/>
           </a:p>
@@ -7183,7 +7185,7 @@
           <a:p>
             <a:fld id="{300EF72D-BF44-4867-ABC7-65F7BCDC414A}" type="datetimeFigureOut">
               <a:rPr lang="fr-FR" smtClean="0"/>
-              <a:t>18/10/2018</a:t>
+              <a:t>09/11/2018</a:t>
             </a:fld>
             <a:endParaRPr lang="fr-FR"/>
           </a:p>
@@ -7819,10 +7821,551 @@
           </a:extLst>
         </p:spPr>
       </p:pic>
+      <p:sp>
+        <p:nvSpPr>
+          <p:cNvPr id="2" name="ZoneTexte 1">
+            <a:extLst>
+              <a:ext uri="{FF2B5EF4-FFF2-40B4-BE49-F238E27FC236}">
+                <a16:creationId xmlns:a16="http://schemas.microsoft.com/office/drawing/2014/main" id="{81B84753-065D-474D-BF7C-3EC035CAD8E6}"/>
+              </a:ext>
+            </a:extLst>
+          </p:cNvPr>
+          <p:cNvSpPr txBox="1"/>
+          <p:nvPr/>
+        </p:nvSpPr>
+        <p:spPr>
+          <a:xfrm>
+            <a:off x="11832232" y="6488668"/>
+            <a:ext cx="719535" cy="369332"/>
+          </a:xfrm>
+          <a:prstGeom prst="rect">
+            <a:avLst/>
+          </a:prstGeom>
+          <a:noFill/>
+        </p:spPr>
+        <p:txBody>
+          <a:bodyPr wrap="square" rtlCol="0">
+            <a:spAutoFit/>
+          </a:bodyPr>
+          <a:lstStyle/>
+          <a:p>
+            <a:r>
+              <a:rPr lang="fr-FR" dirty="0"/>
+              <a:t>1</a:t>
+            </a:r>
+          </a:p>
+        </p:txBody>
+      </p:sp>
     </p:spTree>
     <p:extLst>
       <p:ext uri="{BB962C8B-B14F-4D97-AF65-F5344CB8AC3E}">
         <p14:creationId xmlns:p14="http://schemas.microsoft.com/office/powerpoint/2010/main" val="2632418476"/>
+      </p:ext>
+    </p:extLst>
+  </p:cSld>
+  <p:clrMapOvr>
+    <a:masterClrMapping/>
+  </p:clrMapOvr>
+</p:sld>
+</file>
+
+<file path=ppt/slides/slide10.xml><?xml version="1.0" encoding="utf-8"?>
+<p:sld xmlns:a="http://schemas.openxmlformats.org/drawingml/2006/main" xmlns:r="http://schemas.openxmlformats.org/officeDocument/2006/relationships" xmlns:p="http://schemas.openxmlformats.org/presentationml/2006/main">
+  <p:cSld>
+    <p:spTree>
+      <p:nvGrpSpPr>
+        <p:cNvPr id="1" name=""/>
+        <p:cNvGrpSpPr/>
+        <p:nvPr/>
+      </p:nvGrpSpPr>
+      <p:grpSpPr>
+        <a:xfrm>
+          <a:off x="0" y="0"/>
+          <a:ext cx="0" cy="0"/>
+          <a:chOff x="0" y="0"/>
+          <a:chExt cx="0" cy="0"/>
+        </a:xfrm>
+      </p:grpSpPr>
+      <p:sp>
+        <p:nvSpPr>
+          <p:cNvPr id="2" name="Titre 1">
+            <a:extLst>
+              <a:ext uri="{FF2B5EF4-FFF2-40B4-BE49-F238E27FC236}">
+                <a16:creationId xmlns:a16="http://schemas.microsoft.com/office/drawing/2014/main" id="{27FD481D-44AB-44FC-86FF-AA63DFC993D7}"/>
+              </a:ext>
+            </a:extLst>
+          </p:cNvPr>
+          <p:cNvSpPr>
+            <a:spLocks noGrp="1"/>
+          </p:cNvSpPr>
+          <p:nvPr>
+            <p:ph type="title"/>
+          </p:nvPr>
+        </p:nvSpPr>
+        <p:spPr>
+          <a:xfrm>
+            <a:off x="1646828" y="193264"/>
+            <a:ext cx="9601200" cy="1485900"/>
+          </a:xfrm>
+        </p:spPr>
+        <p:txBody>
+          <a:bodyPr>
+            <a:normAutofit/>
+          </a:bodyPr>
+          <a:lstStyle/>
+          <a:p>
+            <a:r>
+              <a:rPr lang="fr-FR" sz="7200" b="1" dirty="0"/>
+              <a:t>General conclusion</a:t>
+            </a:r>
+          </a:p>
+        </p:txBody>
+      </p:sp>
+      <p:sp>
+        <p:nvSpPr>
+          <p:cNvPr id="3" name="ZoneTexte 2">
+            <a:extLst>
+              <a:ext uri="{FF2B5EF4-FFF2-40B4-BE49-F238E27FC236}">
+                <a16:creationId xmlns:a16="http://schemas.microsoft.com/office/drawing/2014/main" id="{21326D53-3929-4E38-B168-5456A0A141BB}"/>
+              </a:ext>
+            </a:extLst>
+          </p:cNvPr>
+          <p:cNvSpPr txBox="1"/>
+          <p:nvPr/>
+        </p:nvSpPr>
+        <p:spPr>
+          <a:xfrm>
+            <a:off x="11832232" y="6488668"/>
+            <a:ext cx="719535" cy="369332"/>
+          </a:xfrm>
+          <a:prstGeom prst="rect">
+            <a:avLst/>
+          </a:prstGeom>
+          <a:noFill/>
+        </p:spPr>
+        <p:txBody>
+          <a:bodyPr wrap="square" rtlCol="0">
+            <a:spAutoFit/>
+          </a:bodyPr>
+          <a:lstStyle/>
+          <a:p>
+            <a:r>
+              <a:rPr lang="fr-FR" dirty="0"/>
+              <a:t>9</a:t>
+            </a:r>
+          </a:p>
+        </p:txBody>
+      </p:sp>
+      <p:sp>
+        <p:nvSpPr>
+          <p:cNvPr id="4" name="Rectangle 3">
+            <a:extLst>
+              <a:ext uri="{FF2B5EF4-FFF2-40B4-BE49-F238E27FC236}">
+                <a16:creationId xmlns:a16="http://schemas.microsoft.com/office/drawing/2014/main" id="{71D6E7CB-FA23-49D7-B47B-2F165A202D32}"/>
+              </a:ext>
+            </a:extLst>
+          </p:cNvPr>
+          <p:cNvSpPr/>
+          <p:nvPr/>
+        </p:nvSpPr>
+        <p:spPr>
+          <a:xfrm>
+            <a:off x="7018475" y="1629730"/>
+            <a:ext cx="6096000" cy="2657138"/>
+          </a:xfrm>
+          <a:prstGeom prst="rect">
+            <a:avLst/>
+          </a:prstGeom>
+        </p:spPr>
+        <p:txBody>
+          <a:bodyPr>
+            <a:spAutoFit/>
+          </a:bodyPr>
+          <a:lstStyle/>
+          <a:p>
+            <a:pPr lvl="0" defTabSz="914400">
+              <a:spcAft>
+                <a:spcPts val="1415"/>
+              </a:spcAft>
+              <a:buSzPct val="100000"/>
+              <a:defRPr sz="1800" b="0" i="0" u="none" strike="noStrike" kern="0" cap="none" spc="0" baseline="0">
+                <a:solidFill>
+                  <a:srgbClr val="000000"/>
+                </a:solidFill>
+                <a:uFillTx/>
+              </a:defRPr>
+            </a:pPr>
+            <a:r>
+              <a:rPr lang="en-US" sz="2400" b="1" dirty="0">
+                <a:solidFill>
+                  <a:srgbClr val="2C3E50"/>
+                </a:solidFill>
+                <a:latin typeface="Source Sans Pro Semibold" pitchFamily="34"/>
+              </a:rPr>
+              <a:t>Battery runs down quickly</a:t>
+            </a:r>
+          </a:p>
+          <a:p>
+            <a:pPr lvl="0" defTabSz="914400">
+              <a:spcAft>
+                <a:spcPts val="1415"/>
+              </a:spcAft>
+              <a:buSzPct val="100000"/>
+              <a:defRPr sz="1800" b="0" i="0" u="none" strike="noStrike" kern="0" cap="none" spc="0" baseline="0">
+                <a:solidFill>
+                  <a:srgbClr val="000000"/>
+                </a:solidFill>
+                <a:uFillTx/>
+              </a:defRPr>
+            </a:pPr>
+            <a:r>
+              <a:rPr lang="en-US" sz="2400" b="1" dirty="0">
+                <a:solidFill>
+                  <a:srgbClr val="2C3E50"/>
+                </a:solidFill>
+                <a:latin typeface="Source Sans Pro Semibold" pitchFamily="34"/>
+              </a:rPr>
+              <a:t>No prescription eyewear users</a:t>
+            </a:r>
+          </a:p>
+          <a:p>
+            <a:pPr lvl="0" defTabSz="914400">
+              <a:spcAft>
+                <a:spcPts val="1415"/>
+              </a:spcAft>
+              <a:buSzPct val="100000"/>
+              <a:defRPr sz="1800" b="0" i="0" u="none" strike="noStrike" kern="0" cap="none" spc="0" baseline="0">
+                <a:solidFill>
+                  <a:srgbClr val="000000"/>
+                </a:solidFill>
+                <a:uFillTx/>
+              </a:defRPr>
+            </a:pPr>
+            <a:r>
+              <a:rPr lang="en-US" sz="2400" b="1" dirty="0">
+                <a:solidFill>
+                  <a:srgbClr val="2C3E50"/>
+                </a:solidFill>
+                <a:latin typeface="Source Sans Pro Semibold" pitchFamily="34"/>
+              </a:rPr>
+              <a:t>New privacy issues</a:t>
+            </a:r>
+          </a:p>
+          <a:p>
+            <a:pPr lvl="0" defTabSz="914400">
+              <a:spcAft>
+                <a:spcPts val="1415"/>
+              </a:spcAft>
+              <a:buSzPct val="100000"/>
+              <a:defRPr sz="1800" b="0" i="0" u="none" strike="noStrike" kern="0" cap="none" spc="0" baseline="0">
+                <a:solidFill>
+                  <a:srgbClr val="000000"/>
+                </a:solidFill>
+                <a:uFillTx/>
+              </a:defRPr>
+            </a:pPr>
+            <a:r>
+              <a:rPr lang="en-US" sz="2400" b="1" kern="0" dirty="0">
+                <a:solidFill>
+                  <a:srgbClr val="2C3E50"/>
+                </a:solidFill>
+                <a:latin typeface="Source Sans Pro Semibold" pitchFamily="34"/>
+              </a:rPr>
+              <a:t>Project is stop</a:t>
+            </a:r>
+          </a:p>
+          <a:p>
+            <a:pPr lvl="0" defTabSz="914400">
+              <a:spcAft>
+                <a:spcPts val="1415"/>
+              </a:spcAft>
+              <a:buSzPct val="100000"/>
+              <a:defRPr sz="1800" b="0" i="0" u="none" strike="noStrike" kern="0" cap="none" spc="0" baseline="0">
+                <a:solidFill>
+                  <a:srgbClr val="000000"/>
+                </a:solidFill>
+                <a:uFillTx/>
+              </a:defRPr>
+            </a:pPr>
+            <a:r>
+              <a:rPr lang="en-US" sz="2400" b="1" dirty="0">
+                <a:solidFill>
+                  <a:srgbClr val="2C3E50"/>
+                </a:solidFill>
+                <a:latin typeface="Source Sans Pro Semibold" pitchFamily="34"/>
+              </a:rPr>
+              <a:t>Very expensive</a:t>
+            </a:r>
+          </a:p>
+        </p:txBody>
+      </p:sp>
+      <p:sp>
+        <p:nvSpPr>
+          <p:cNvPr id="5" name="Espace réservé du texte 3">
+            <a:extLst>
+              <a:ext uri="{FF2B5EF4-FFF2-40B4-BE49-F238E27FC236}">
+                <a16:creationId xmlns:a16="http://schemas.microsoft.com/office/drawing/2014/main" id="{424F4074-8393-44F0-B7BA-FB9EC47BD3D8}"/>
+              </a:ext>
+            </a:extLst>
+          </p:cNvPr>
+          <p:cNvSpPr txBox="1"/>
+          <p:nvPr/>
+        </p:nvSpPr>
+        <p:spPr>
+          <a:xfrm>
+            <a:off x="2514642" y="1340431"/>
+            <a:ext cx="7865571" cy="3235736"/>
+          </a:xfrm>
+          <a:prstGeom prst="rect">
+            <a:avLst/>
+          </a:prstGeom>
+          <a:noFill/>
+          <a:ln cap="flat">
+            <a:noFill/>
+          </a:ln>
+        </p:spPr>
+        <p:txBody>
+          <a:bodyPr vert="horz" wrap="square" lIns="0" tIns="0" rIns="0" bIns="0" anchor="t" anchorCtr="0" compatLnSpc="1">
+            <a:noAutofit/>
+          </a:bodyPr>
+          <a:lstStyle/>
+          <a:p>
+            <a:pPr marR="0" lvl="0" algn="l" defTabSz="914400" rtl="0" fontAlgn="auto" hangingPunct="1">
+              <a:lnSpc>
+                <a:spcPct val="100000"/>
+              </a:lnSpc>
+              <a:spcBef>
+                <a:spcPts val="0"/>
+              </a:spcBef>
+              <a:spcAft>
+                <a:spcPts val="1415"/>
+              </a:spcAft>
+              <a:buSzPct val="100000"/>
+              <a:tabLst/>
+              <a:defRPr sz="1800" b="0" i="0" u="none" strike="noStrike" kern="0" cap="none" spc="0" baseline="0">
+                <a:solidFill>
+                  <a:srgbClr val="000000"/>
+                </a:solidFill>
+                <a:uFillTx/>
+              </a:defRPr>
+            </a:pPr>
+            <a:r>
+              <a:rPr lang="en-US" sz="2400" b="1" i="0" u="none" strike="noStrike" kern="1200" cap="none" spc="0" baseline="0" dirty="0">
+                <a:solidFill>
+                  <a:srgbClr val="2C3E50"/>
+                </a:solidFill>
+                <a:uFillTx/>
+                <a:latin typeface="Source Sans Pro Semibold" pitchFamily="34"/>
+              </a:rPr>
+              <a:t>Multi task</a:t>
+            </a:r>
+          </a:p>
+          <a:p>
+            <a:pPr marR="0" lvl="0" algn="l" defTabSz="914400" rtl="0" fontAlgn="auto" hangingPunct="1">
+              <a:lnSpc>
+                <a:spcPct val="100000"/>
+              </a:lnSpc>
+              <a:spcBef>
+                <a:spcPts val="0"/>
+              </a:spcBef>
+              <a:spcAft>
+                <a:spcPts val="1415"/>
+              </a:spcAft>
+              <a:buSzPct val="100000"/>
+              <a:tabLst/>
+              <a:defRPr sz="1800" b="0" i="0" u="none" strike="noStrike" kern="0" cap="none" spc="0" baseline="0">
+                <a:solidFill>
+                  <a:srgbClr val="000000"/>
+                </a:solidFill>
+                <a:uFillTx/>
+              </a:defRPr>
+            </a:pPr>
+            <a:r>
+              <a:rPr lang="en-US" sz="2400" b="1" i="0" u="none" strike="noStrike" kern="0" cap="none" spc="0" baseline="0" dirty="0">
+                <a:solidFill>
+                  <a:srgbClr val="2C3E50"/>
+                </a:solidFill>
+                <a:uFillTx/>
+                <a:latin typeface="Source Sans Pro Semibold" pitchFamily="34"/>
+              </a:rPr>
+              <a:t>Can used with others devices</a:t>
+            </a:r>
+          </a:p>
+          <a:p>
+            <a:pPr marR="0" lvl="0" algn="l" defTabSz="914400" rtl="0" fontAlgn="auto" hangingPunct="1">
+              <a:lnSpc>
+                <a:spcPct val="100000"/>
+              </a:lnSpc>
+              <a:spcBef>
+                <a:spcPts val="0"/>
+              </a:spcBef>
+              <a:spcAft>
+                <a:spcPts val="1415"/>
+              </a:spcAft>
+              <a:buSzPct val="100000"/>
+              <a:tabLst/>
+              <a:defRPr sz="1800" b="0" i="0" u="none" strike="noStrike" kern="0" cap="none" spc="0" baseline="0">
+                <a:solidFill>
+                  <a:srgbClr val="000000"/>
+                </a:solidFill>
+                <a:uFillTx/>
+              </a:defRPr>
+            </a:pPr>
+            <a:r>
+              <a:rPr lang="en-US" sz="2400" b="1" i="0" u="none" strike="noStrike" kern="0" cap="none" spc="0" baseline="0" dirty="0">
+                <a:solidFill>
+                  <a:srgbClr val="2C3E50"/>
+                </a:solidFill>
+                <a:uFillTx/>
+                <a:latin typeface="Source Sans Pro Semibold" pitchFamily="34"/>
+              </a:rPr>
+              <a:t>Improve hands-free initiatives</a:t>
+            </a:r>
+          </a:p>
+          <a:p>
+            <a:pPr marR="0" lvl="0" algn="l" defTabSz="914400" rtl="0" fontAlgn="auto" hangingPunct="1">
+              <a:lnSpc>
+                <a:spcPct val="100000"/>
+              </a:lnSpc>
+              <a:spcBef>
+                <a:spcPts val="0"/>
+              </a:spcBef>
+              <a:spcAft>
+                <a:spcPts val="1415"/>
+              </a:spcAft>
+              <a:buSzPct val="100000"/>
+              <a:tabLst/>
+              <a:defRPr sz="1800" b="0" i="0" u="none" strike="noStrike" kern="0" cap="none" spc="0" baseline="0">
+                <a:solidFill>
+                  <a:srgbClr val="000000"/>
+                </a:solidFill>
+                <a:uFillTx/>
+              </a:defRPr>
+            </a:pPr>
+            <a:r>
+              <a:rPr lang="en-US" sz="2400" b="1" i="0" u="none" strike="noStrike" kern="1200" cap="none" spc="0" baseline="0" dirty="0">
+                <a:solidFill>
+                  <a:srgbClr val="2C3E50"/>
+                </a:solidFill>
+                <a:uFillTx/>
+                <a:latin typeface="Source Sans Pro Semibold" pitchFamily="34"/>
+              </a:rPr>
+              <a:t>Any interference with visio</a:t>
+            </a:r>
+            <a:r>
+              <a:rPr lang="en-US" sz="2400" b="1" i="0" u="none" strike="noStrike" kern="0" cap="none" spc="0" baseline="0" dirty="0">
+                <a:solidFill>
+                  <a:srgbClr val="2C3E50"/>
+                </a:solidFill>
+                <a:uFillTx/>
+                <a:latin typeface="Source Sans Pro Semibold" pitchFamily="34"/>
+              </a:rPr>
+              <a:t>n</a:t>
+            </a:r>
+          </a:p>
+          <a:p>
+            <a:pPr marR="0" lvl="0" algn="l" defTabSz="914400" rtl="0" fontAlgn="auto" hangingPunct="1">
+              <a:lnSpc>
+                <a:spcPct val="100000"/>
+              </a:lnSpc>
+              <a:spcBef>
+                <a:spcPts val="0"/>
+              </a:spcBef>
+              <a:spcAft>
+                <a:spcPts val="1415"/>
+              </a:spcAft>
+              <a:buSzPct val="100000"/>
+              <a:tabLst/>
+              <a:defRPr sz="1800" b="0" i="0" u="none" strike="noStrike" kern="0" cap="none" spc="0" baseline="0">
+                <a:solidFill>
+                  <a:srgbClr val="000000"/>
+                </a:solidFill>
+                <a:uFillTx/>
+              </a:defRPr>
+            </a:pPr>
+            <a:r>
+              <a:rPr lang="en-US" sz="2400" b="1" i="0" u="none" strike="noStrike" kern="1200" cap="none" spc="0" baseline="0" dirty="0">
+                <a:solidFill>
+                  <a:srgbClr val="2C3E50"/>
+                </a:solidFill>
+                <a:uFillTx/>
+                <a:latin typeface="Source Sans Pro Semibold" pitchFamily="34"/>
+              </a:rPr>
+              <a:t>Take photo and video</a:t>
+            </a:r>
+          </a:p>
+          <a:p>
+            <a:pPr marR="0" lvl="0" algn="l" defTabSz="914400" rtl="0" fontAlgn="auto" hangingPunct="1">
+              <a:lnSpc>
+                <a:spcPct val="100000"/>
+              </a:lnSpc>
+              <a:spcBef>
+                <a:spcPts val="0"/>
+              </a:spcBef>
+              <a:spcAft>
+                <a:spcPts val="1415"/>
+              </a:spcAft>
+              <a:buSzPct val="100000"/>
+              <a:tabLst/>
+              <a:defRPr sz="1800" b="0" i="0" u="none" strike="noStrike" kern="0" cap="none" spc="0" baseline="0">
+                <a:solidFill>
+                  <a:srgbClr val="000000"/>
+                </a:solidFill>
+                <a:uFillTx/>
+              </a:defRPr>
+            </a:pPr>
+            <a:r>
+              <a:rPr lang="en-US" sz="2400" b="1" i="0" u="none" strike="noStrike" kern="1200" cap="none" spc="0" baseline="0" dirty="0">
+                <a:solidFill>
+                  <a:srgbClr val="2C3E50"/>
+                </a:solidFill>
+                <a:uFillTx/>
+                <a:latin typeface="Source Sans Pro Semibold" pitchFamily="34"/>
+              </a:rPr>
+              <a:t>Lightweight enough</a:t>
+            </a:r>
+          </a:p>
+        </p:txBody>
+      </p:sp>
+      <p:sp>
+        <p:nvSpPr>
+          <p:cNvPr id="6" name="ZoneTexte 5">
+            <a:extLst>
+              <a:ext uri="{FF2B5EF4-FFF2-40B4-BE49-F238E27FC236}">
+                <a16:creationId xmlns:a16="http://schemas.microsoft.com/office/drawing/2014/main" id="{E74C37E3-1985-4EE9-855E-4FE2AE6FCD43}"/>
+              </a:ext>
+            </a:extLst>
+          </p:cNvPr>
+          <p:cNvSpPr txBox="1"/>
+          <p:nvPr/>
+        </p:nvSpPr>
+        <p:spPr>
+          <a:xfrm>
+            <a:off x="5517921" y="5307735"/>
+            <a:ext cx="1500554" cy="584775"/>
+          </a:xfrm>
+          <a:prstGeom prst="rect">
+            <a:avLst/>
+          </a:prstGeom>
+          <a:noFill/>
+        </p:spPr>
+        <p:txBody>
+          <a:bodyPr wrap="square" rtlCol="0">
+            <a:spAutoFit/>
+          </a:bodyPr>
+          <a:lstStyle/>
+          <a:p>
+            <a:r>
+              <a:rPr lang="fr-FR" sz="3200" b="1" dirty="0"/>
+              <a:t>Utopia</a:t>
+            </a:r>
+          </a:p>
+        </p:txBody>
+      </p:sp>
+    </p:spTree>
+    <p:extLst>
+      <p:ext uri="{BB962C8B-B14F-4D97-AF65-F5344CB8AC3E}">
+        <p14:creationId xmlns:p14="http://schemas.microsoft.com/office/powerpoint/2010/main" val="3428990371"/>
       </p:ext>
     </p:extLst>
   </p:cSld>
@@ -7952,6 +8495,41 @@
               <a:buNone/>
             </a:pPr>
             <a:endParaRPr lang="en-US" dirty="0"/>
+          </a:p>
+        </p:txBody>
+      </p:sp>
+      <p:sp>
+        <p:nvSpPr>
+          <p:cNvPr id="4" name="ZoneTexte 3">
+            <a:extLst>
+              <a:ext uri="{FF2B5EF4-FFF2-40B4-BE49-F238E27FC236}">
+                <a16:creationId xmlns:a16="http://schemas.microsoft.com/office/drawing/2014/main" id="{7BB12559-1130-45DD-ACFC-0DF1F1623962}"/>
+              </a:ext>
+            </a:extLst>
+          </p:cNvPr>
+          <p:cNvSpPr txBox="1"/>
+          <p:nvPr/>
+        </p:nvSpPr>
+        <p:spPr>
+          <a:xfrm>
+            <a:off x="11832232" y="6488668"/>
+            <a:ext cx="719535" cy="369332"/>
+          </a:xfrm>
+          <a:prstGeom prst="rect">
+            <a:avLst/>
+          </a:prstGeom>
+          <a:noFill/>
+        </p:spPr>
+        <p:txBody>
+          <a:bodyPr wrap="square" rtlCol="0">
+            <a:spAutoFit/>
+          </a:bodyPr>
+          <a:lstStyle/>
+          <a:p>
+            <a:r>
+              <a:rPr lang="fr-FR" dirty="0"/>
+              <a:t>2</a:t>
+            </a:r>
           </a:p>
         </p:txBody>
       </p:sp>
@@ -8246,6 +8824,41 @@
           </a:extLst>
         </p:spPr>
       </p:pic>
+      <p:sp>
+        <p:nvSpPr>
+          <p:cNvPr id="7" name="ZoneTexte 6">
+            <a:extLst>
+              <a:ext uri="{FF2B5EF4-FFF2-40B4-BE49-F238E27FC236}">
+                <a16:creationId xmlns:a16="http://schemas.microsoft.com/office/drawing/2014/main" id="{6C8D5BF6-9A78-43AB-AB05-FEF8B33B9E3F}"/>
+              </a:ext>
+            </a:extLst>
+          </p:cNvPr>
+          <p:cNvSpPr txBox="1"/>
+          <p:nvPr/>
+        </p:nvSpPr>
+        <p:spPr>
+          <a:xfrm>
+            <a:off x="11832232" y="6488668"/>
+            <a:ext cx="719535" cy="369332"/>
+          </a:xfrm>
+          <a:prstGeom prst="rect">
+            <a:avLst/>
+          </a:prstGeom>
+          <a:noFill/>
+        </p:spPr>
+        <p:txBody>
+          <a:bodyPr wrap="square" rtlCol="0">
+            <a:spAutoFit/>
+          </a:bodyPr>
+          <a:lstStyle/>
+          <a:p>
+            <a:r>
+              <a:rPr lang="fr-FR" dirty="0"/>
+              <a:t>3</a:t>
+            </a:r>
+          </a:p>
+        </p:txBody>
+      </p:sp>
     </p:spTree>
     <p:extLst>
       <p:ext uri="{BB962C8B-B14F-4D97-AF65-F5344CB8AC3E}">
@@ -8560,6 +9173,41 @@
           </a:p>
         </p:txBody>
       </p:sp>
+      <p:sp>
+        <p:nvSpPr>
+          <p:cNvPr id="7" name="ZoneTexte 6">
+            <a:extLst>
+              <a:ext uri="{FF2B5EF4-FFF2-40B4-BE49-F238E27FC236}">
+                <a16:creationId xmlns:a16="http://schemas.microsoft.com/office/drawing/2014/main" id="{F472E3DF-195A-429A-80C1-1ACFBFEF165A}"/>
+              </a:ext>
+            </a:extLst>
+          </p:cNvPr>
+          <p:cNvSpPr txBox="1"/>
+          <p:nvPr/>
+        </p:nvSpPr>
+        <p:spPr>
+          <a:xfrm>
+            <a:off x="11832232" y="6488668"/>
+            <a:ext cx="719535" cy="369332"/>
+          </a:xfrm>
+          <a:prstGeom prst="rect">
+            <a:avLst/>
+          </a:prstGeom>
+          <a:noFill/>
+        </p:spPr>
+        <p:txBody>
+          <a:bodyPr wrap="square" rtlCol="0">
+            <a:spAutoFit/>
+          </a:bodyPr>
+          <a:lstStyle/>
+          <a:p>
+            <a:r>
+              <a:rPr lang="fr-FR" dirty="0"/>
+              <a:t>4	</a:t>
+            </a:r>
+          </a:p>
+        </p:txBody>
+      </p:sp>
     </p:spTree>
     <p:extLst>
       <p:ext uri="{BB962C8B-B14F-4D97-AF65-F5344CB8AC3E}">
@@ -8745,6 +9393,41 @@
           </a:prstGeom>
         </p:spPr>
       </p:pic>
+      <p:sp>
+        <p:nvSpPr>
+          <p:cNvPr id="7" name="ZoneTexte 6">
+            <a:extLst>
+              <a:ext uri="{FF2B5EF4-FFF2-40B4-BE49-F238E27FC236}">
+                <a16:creationId xmlns:a16="http://schemas.microsoft.com/office/drawing/2014/main" id="{B4F9734E-BE35-4864-BBA6-042947D39603}"/>
+              </a:ext>
+            </a:extLst>
+          </p:cNvPr>
+          <p:cNvSpPr txBox="1"/>
+          <p:nvPr/>
+        </p:nvSpPr>
+        <p:spPr>
+          <a:xfrm>
+            <a:off x="11832232" y="6488668"/>
+            <a:ext cx="719535" cy="369332"/>
+          </a:xfrm>
+          <a:prstGeom prst="rect">
+            <a:avLst/>
+          </a:prstGeom>
+          <a:noFill/>
+        </p:spPr>
+        <p:txBody>
+          <a:bodyPr wrap="square" rtlCol="0">
+            <a:spAutoFit/>
+          </a:bodyPr>
+          <a:lstStyle/>
+          <a:p>
+            <a:r>
+              <a:rPr lang="fr-FR" dirty="0"/>
+              <a:t>5</a:t>
+            </a:r>
+          </a:p>
+        </p:txBody>
+      </p:sp>
     </p:spTree>
     <p:extLst>
       <p:ext uri="{BB962C8B-B14F-4D97-AF65-F5344CB8AC3E}">
@@ -9115,6 +9798,41 @@
           </a:extLst>
         </p:spPr>
       </p:pic>
+      <p:sp>
+        <p:nvSpPr>
+          <p:cNvPr id="7" name="ZoneTexte 6">
+            <a:extLst>
+              <a:ext uri="{FF2B5EF4-FFF2-40B4-BE49-F238E27FC236}">
+                <a16:creationId xmlns:a16="http://schemas.microsoft.com/office/drawing/2014/main" id="{CB77EC7B-D8E0-49A9-9401-F59F5C206C62}"/>
+              </a:ext>
+            </a:extLst>
+          </p:cNvPr>
+          <p:cNvSpPr txBox="1"/>
+          <p:nvPr/>
+        </p:nvSpPr>
+        <p:spPr>
+          <a:xfrm>
+            <a:off x="11832232" y="6488668"/>
+            <a:ext cx="719535" cy="369332"/>
+          </a:xfrm>
+          <a:prstGeom prst="rect">
+            <a:avLst/>
+          </a:prstGeom>
+          <a:noFill/>
+        </p:spPr>
+        <p:txBody>
+          <a:bodyPr wrap="square" rtlCol="0">
+            <a:spAutoFit/>
+          </a:bodyPr>
+          <a:lstStyle/>
+          <a:p>
+            <a:r>
+              <a:rPr lang="fr-FR" dirty="0"/>
+              <a:t>6</a:t>
+            </a:r>
+          </a:p>
+        </p:txBody>
+      </p:sp>
     </p:spTree>
     <p:extLst>
       <p:ext uri="{BB962C8B-B14F-4D97-AF65-F5344CB8AC3E}">
@@ -9326,6 +10044,41 @@
           </a:extLst>
         </p:spPr>
       </p:pic>
+      <p:sp>
+        <p:nvSpPr>
+          <p:cNvPr id="6" name="ZoneTexte 5">
+            <a:extLst>
+              <a:ext uri="{FF2B5EF4-FFF2-40B4-BE49-F238E27FC236}">
+                <a16:creationId xmlns:a16="http://schemas.microsoft.com/office/drawing/2014/main" id="{1ABB8B79-B0C5-4209-8C0B-87D55DC5C44E}"/>
+              </a:ext>
+            </a:extLst>
+          </p:cNvPr>
+          <p:cNvSpPr txBox="1"/>
+          <p:nvPr/>
+        </p:nvSpPr>
+        <p:spPr>
+          <a:xfrm>
+            <a:off x="11832232" y="6488668"/>
+            <a:ext cx="719535" cy="369332"/>
+          </a:xfrm>
+          <a:prstGeom prst="rect">
+            <a:avLst/>
+          </a:prstGeom>
+          <a:noFill/>
+        </p:spPr>
+        <p:txBody>
+          <a:bodyPr wrap="square" rtlCol="0">
+            <a:spAutoFit/>
+          </a:bodyPr>
+          <a:lstStyle/>
+          <a:p>
+            <a:r>
+              <a:rPr lang="fr-FR" dirty="0"/>
+              <a:t>7</a:t>
+            </a:r>
+          </a:p>
+        </p:txBody>
+      </p:sp>
     </p:spTree>
     <p:extLst>
       <p:ext uri="{BB962C8B-B14F-4D97-AF65-F5344CB8AC3E}">
@@ -9563,6 +10316,41 @@
           </a:prstGeom>
         </p:spPr>
       </p:pic>
+      <p:sp>
+        <p:nvSpPr>
+          <p:cNvPr id="8" name="ZoneTexte 7">
+            <a:extLst>
+              <a:ext uri="{FF2B5EF4-FFF2-40B4-BE49-F238E27FC236}">
+                <a16:creationId xmlns:a16="http://schemas.microsoft.com/office/drawing/2014/main" id="{BE7CC097-9213-40B9-AC6E-C703E3187DE6}"/>
+              </a:ext>
+            </a:extLst>
+          </p:cNvPr>
+          <p:cNvSpPr txBox="1"/>
+          <p:nvPr/>
+        </p:nvSpPr>
+        <p:spPr>
+          <a:xfrm>
+            <a:off x="11832232" y="6488668"/>
+            <a:ext cx="719535" cy="369332"/>
+          </a:xfrm>
+          <a:prstGeom prst="rect">
+            <a:avLst/>
+          </a:prstGeom>
+          <a:noFill/>
+        </p:spPr>
+        <p:txBody>
+          <a:bodyPr wrap="square" rtlCol="0">
+            <a:spAutoFit/>
+          </a:bodyPr>
+          <a:lstStyle/>
+          <a:p>
+            <a:r>
+              <a:rPr lang="fr-FR" dirty="0"/>
+              <a:t>8</a:t>
+            </a:r>
+          </a:p>
+        </p:txBody>
+      </p:sp>
     </p:spTree>
     <p:extLst>
       <p:ext uri="{BB962C8B-B14F-4D97-AF65-F5344CB8AC3E}">
@@ -9598,7 +10386,7 @@
           <p:cNvPr id="2" name="Titre 1">
             <a:extLst>
               <a:ext uri="{FF2B5EF4-FFF2-40B4-BE49-F238E27FC236}">
-                <a16:creationId xmlns:a16="http://schemas.microsoft.com/office/drawing/2014/main" id="{27FD481D-44AB-44FC-86FF-AA63DFC993D7}"/>
+                <a16:creationId xmlns:a16="http://schemas.microsoft.com/office/drawing/2014/main" id="{44DB18F2-EDAD-4C74-9BF1-1B80FEBD57ED}"/>
               </a:ext>
             </a:extLst>
           </p:cNvPr>
@@ -9611,19 +10399,158 @@
         </p:nvSpPr>
         <p:spPr>
           <a:xfrm>
-            <a:off x="2420551" y="2686050"/>
-            <a:ext cx="9601200" cy="1485900"/>
-          </a:xfrm>
-        </p:spPr>
-        <p:txBody>
-          <a:bodyPr>
-            <a:normAutofit/>
+            <a:off x="1912987" y="306333"/>
+            <a:ext cx="8911687" cy="1280890"/>
+          </a:xfrm>
+        </p:spPr>
+        <p:txBody>
+          <a:bodyPr/>
+          <a:lstStyle/>
+          <a:p>
+            <a:endParaRPr lang="fr-FR"/>
+          </a:p>
+        </p:txBody>
+      </p:sp>
+      <p:pic>
+        <p:nvPicPr>
+          <p:cNvPr id="4" name="Picture 4" descr="RÃ©sultat de recherche d'images pour &quot;smart glasses&quot;">
+            <a:extLst>
+              <a:ext uri="{FF2B5EF4-FFF2-40B4-BE49-F238E27FC236}">
+                <a16:creationId xmlns:a16="http://schemas.microsoft.com/office/drawing/2014/main" id="{6687A735-6488-4256-9F06-2CCE9066B9CA}"/>
+              </a:ext>
+            </a:extLst>
+          </p:cNvPr>
+          <p:cNvPicPr>
+            <a:picLocks noChangeAspect="1"/>
+          </p:cNvPicPr>
+          <p:nvPr/>
+        </p:nvPicPr>
+        <p:blipFill>
+          <a:blip r:embed="rId2"/>
+          <a:srcRect/>
+          <a:stretch>
+            <a:fillRect/>
+          </a:stretch>
+        </p:blipFill>
+        <p:spPr>
+          <a:xfrm>
+            <a:off x="7043614" y="3016903"/>
+            <a:ext cx="3141000" cy="1743075"/>
+          </a:xfrm>
+          <a:prstGeom prst="rect">
+            <a:avLst/>
+          </a:prstGeom>
+          <a:noFill/>
+          <a:ln cap="flat">
+            <a:noFill/>
+          </a:ln>
+        </p:spPr>
+      </p:pic>
+      <p:pic>
+        <p:nvPicPr>
+          <p:cNvPr id="5" name="Picture 2" descr="RÃ©sultat de recherche d'images pour &quot;smart glasses&quot;">
+            <a:extLst>
+              <a:ext uri="{FF2B5EF4-FFF2-40B4-BE49-F238E27FC236}">
+                <a16:creationId xmlns:a16="http://schemas.microsoft.com/office/drawing/2014/main" id="{98287D61-AFAF-41DC-8BD0-94E602F4FBB8}"/>
+              </a:ext>
+            </a:extLst>
+          </p:cNvPr>
+          <p:cNvPicPr>
+            <a:picLocks noChangeAspect="1"/>
+          </p:cNvPicPr>
+          <p:nvPr/>
+        </p:nvPicPr>
+        <p:blipFill>
+          <a:blip r:embed="rId3"/>
+          <a:srcRect/>
+          <a:stretch>
+            <a:fillRect/>
+          </a:stretch>
+        </p:blipFill>
+        <p:spPr>
+          <a:xfrm>
+            <a:off x="2007386" y="3197877"/>
+            <a:ext cx="3305171" cy="1381128"/>
+          </a:xfrm>
+          <a:prstGeom prst="rect">
+            <a:avLst/>
+          </a:prstGeom>
+          <a:noFill/>
+          <a:ln cap="flat">
+            <a:noFill/>
+          </a:ln>
+        </p:spPr>
+      </p:pic>
+      <p:sp>
+        <p:nvSpPr>
+          <p:cNvPr id="6" name="ZoneTexte 5">
+            <a:extLst>
+              <a:ext uri="{FF2B5EF4-FFF2-40B4-BE49-F238E27FC236}">
+                <a16:creationId xmlns:a16="http://schemas.microsoft.com/office/drawing/2014/main" id="{3C6C15AF-B938-4877-81BF-ABD6F12D2696}"/>
+              </a:ext>
+            </a:extLst>
+          </p:cNvPr>
+          <p:cNvSpPr txBox="1"/>
+          <p:nvPr/>
+        </p:nvSpPr>
+        <p:spPr>
+          <a:xfrm>
+            <a:off x="3015179" y="4759978"/>
+            <a:ext cx="1875693" cy="369332"/>
+          </a:xfrm>
+          <a:prstGeom prst="rect">
+            <a:avLst/>
+          </a:prstGeom>
+          <a:noFill/>
+        </p:spPr>
+        <p:txBody>
+          <a:bodyPr wrap="square" rtlCol="0">
+            <a:spAutoFit/>
           </a:bodyPr>
           <a:lstStyle/>
           <a:p>
             <a:r>
-              <a:rPr lang="fr-FR" sz="7200" b="1" dirty="0"/>
-              <a:t>General conclusion</a:t>
+              <a:rPr lang="fr-FR" b="1" dirty="0" err="1"/>
+              <a:t>Vuzix</a:t>
+            </a:r>
+            <a:r>
+              <a:rPr lang="fr-FR" b="1" dirty="0"/>
+              <a:t> M100</a:t>
+            </a:r>
+          </a:p>
+        </p:txBody>
+      </p:sp>
+      <p:sp>
+        <p:nvSpPr>
+          <p:cNvPr id="7" name="ZoneTexte 6">
+            <a:extLst>
+              <a:ext uri="{FF2B5EF4-FFF2-40B4-BE49-F238E27FC236}">
+                <a16:creationId xmlns:a16="http://schemas.microsoft.com/office/drawing/2014/main" id="{7FE2F6CB-795A-49F6-8B2B-3D6035399E07}"/>
+              </a:ext>
+            </a:extLst>
+          </p:cNvPr>
+          <p:cNvSpPr txBox="1"/>
+          <p:nvPr/>
+        </p:nvSpPr>
+        <p:spPr>
+          <a:xfrm>
+            <a:off x="8027960" y="4759978"/>
+            <a:ext cx="1875693" cy="369332"/>
+          </a:xfrm>
+          <a:prstGeom prst="rect">
+            <a:avLst/>
+          </a:prstGeom>
+          <a:noFill/>
+        </p:spPr>
+        <p:txBody>
+          <a:bodyPr wrap="square" rtlCol="0">
+            <a:spAutoFit/>
+          </a:bodyPr>
+          <a:lstStyle/>
+          <a:p>
+            <a:r>
+              <a:rPr lang="fr-FR" b="1" dirty="0"/>
+              <a:t>X1 Smart</a:t>
             </a:r>
           </a:p>
         </p:txBody>
@@ -9631,7 +10558,7 @@
     </p:spTree>
     <p:extLst>
       <p:ext uri="{BB962C8B-B14F-4D97-AF65-F5344CB8AC3E}">
-        <p14:creationId xmlns:p14="http://schemas.microsoft.com/office/powerpoint/2010/main" val="3428990371"/>
+        <p14:creationId xmlns:p14="http://schemas.microsoft.com/office/powerpoint/2010/main" val="3695384703"/>
       </p:ext>
     </p:extLst>
   </p:cSld>

</xml_diff>